<commit_message>
bug fixes and next/prev chan selection
</commit_message>
<xml_diff>
--- a/icon.pptx
+++ b/icon.pptx
@@ -6,6 +6,7 @@
   </p:sldMasterIdLst>
   <p:sldIdLst>
     <p:sldId id="260" r:id="rId2"/>
+    <p:sldId id="261" r:id="rId3"/>
   </p:sldIdLst>
   <p:sldSz cx="1800225" cy="1800225"/>
   <p:notesSz cx="6858000" cy="9144000"/>
@@ -154,7 +155,7 @@
           </a:lstStyle>
           <a:p>
             <a:r>
-              <a:rPr lang="en-US" smtClean="0"/>
+              <a:rPr lang="en-US"/>
               <a:t>Click to edit Master title style</a:t>
             </a:r>
             <a:endParaRPr lang="en-US" dirty="0"/>
@@ -219,7 +220,7 @@
           </a:lstStyle>
           <a:p>
             <a:r>
-              <a:rPr lang="en-US" smtClean="0"/>
+              <a:rPr lang="en-US"/>
               <a:t>Click to edit Master subtitle style</a:t>
             </a:r>
             <a:endParaRPr lang="en-US" dirty="0"/>
@@ -243,7 +244,7 @@
           <a:p>
             <a:fld id="{4C8584FF-F624-456A-A5E3-5DD8FA74DA99}" type="datetimeFigureOut">
               <a:rPr lang="en-GB" smtClean="0"/>
-              <a:t>12/12/2018</a:t>
+              <a:t>18/09/2019</a:t>
             </a:fld>
             <a:endParaRPr lang="en-GB"/>
           </a:p>
@@ -337,7 +338,7 @@
           <a:lstStyle/>
           <a:p>
             <a:r>
-              <a:rPr lang="en-US" smtClean="0"/>
+              <a:rPr lang="en-US"/>
               <a:t>Click to edit Master title style</a:t>
             </a:r>
             <a:endParaRPr lang="en-US" dirty="0"/>
@@ -361,35 +362,35 @@
           <a:p>
             <a:pPr lvl="0"/>
             <a:r>
-              <a:rPr lang="en-US" smtClean="0"/>
+              <a:rPr lang="en-US"/>
               <a:t>Edit Master text styles</a:t>
             </a:r>
           </a:p>
           <a:p>
             <a:pPr lvl="1"/>
             <a:r>
-              <a:rPr lang="en-US" smtClean="0"/>
+              <a:rPr lang="en-US"/>
               <a:t>Second level</a:t>
             </a:r>
           </a:p>
           <a:p>
             <a:pPr lvl="2"/>
             <a:r>
-              <a:rPr lang="en-US" smtClean="0"/>
+              <a:rPr lang="en-US"/>
               <a:t>Third level</a:t>
             </a:r>
           </a:p>
           <a:p>
             <a:pPr lvl="3"/>
             <a:r>
-              <a:rPr lang="en-US" smtClean="0"/>
+              <a:rPr lang="en-US"/>
               <a:t>Fourth level</a:t>
             </a:r>
           </a:p>
           <a:p>
             <a:pPr lvl="4"/>
             <a:r>
-              <a:rPr lang="en-US" smtClean="0"/>
+              <a:rPr lang="en-US"/>
               <a:t>Fifth level</a:t>
             </a:r>
             <a:endParaRPr lang="en-US" dirty="0"/>
@@ -413,7 +414,7 @@
           <a:p>
             <a:fld id="{4C8584FF-F624-456A-A5E3-5DD8FA74DA99}" type="datetimeFigureOut">
               <a:rPr lang="en-GB" smtClean="0"/>
-              <a:t>12/12/2018</a:t>
+              <a:t>18/09/2019</a:t>
             </a:fld>
             <a:endParaRPr lang="en-GB"/>
           </a:p>
@@ -512,7 +513,7 @@
           <a:lstStyle/>
           <a:p>
             <a:r>
-              <a:rPr lang="en-US" smtClean="0"/>
+              <a:rPr lang="en-US"/>
               <a:t>Click to edit Master title style</a:t>
             </a:r>
             <a:endParaRPr lang="en-US" dirty="0"/>
@@ -541,35 +542,35 @@
           <a:p>
             <a:pPr lvl="0"/>
             <a:r>
-              <a:rPr lang="en-US" smtClean="0"/>
+              <a:rPr lang="en-US"/>
               <a:t>Edit Master text styles</a:t>
             </a:r>
           </a:p>
           <a:p>
             <a:pPr lvl="1"/>
             <a:r>
-              <a:rPr lang="en-US" smtClean="0"/>
+              <a:rPr lang="en-US"/>
               <a:t>Second level</a:t>
             </a:r>
           </a:p>
           <a:p>
             <a:pPr lvl="2"/>
             <a:r>
-              <a:rPr lang="en-US" smtClean="0"/>
+              <a:rPr lang="en-US"/>
               <a:t>Third level</a:t>
             </a:r>
           </a:p>
           <a:p>
             <a:pPr lvl="3"/>
             <a:r>
-              <a:rPr lang="en-US" smtClean="0"/>
+              <a:rPr lang="en-US"/>
               <a:t>Fourth level</a:t>
             </a:r>
           </a:p>
           <a:p>
             <a:pPr lvl="4"/>
             <a:r>
-              <a:rPr lang="en-US" smtClean="0"/>
+              <a:rPr lang="en-US"/>
               <a:t>Fifth level</a:t>
             </a:r>
             <a:endParaRPr lang="en-US" dirty="0"/>
@@ -593,7 +594,7 @@
           <a:p>
             <a:fld id="{4C8584FF-F624-456A-A5E3-5DD8FA74DA99}" type="datetimeFigureOut">
               <a:rPr lang="en-GB" smtClean="0"/>
-              <a:t>12/12/2018</a:t>
+              <a:t>18/09/2019</a:t>
             </a:fld>
             <a:endParaRPr lang="en-GB"/>
           </a:p>
@@ -687,7 +688,7 @@
           <a:lstStyle/>
           <a:p>
             <a:r>
-              <a:rPr lang="en-US" smtClean="0"/>
+              <a:rPr lang="en-US"/>
               <a:t>Click to edit Master title style</a:t>
             </a:r>
             <a:endParaRPr lang="en-US" dirty="0"/>
@@ -711,35 +712,35 @@
           <a:p>
             <a:pPr lvl="0"/>
             <a:r>
-              <a:rPr lang="en-US" smtClean="0"/>
+              <a:rPr lang="en-US"/>
               <a:t>Edit Master text styles</a:t>
             </a:r>
           </a:p>
           <a:p>
             <a:pPr lvl="1"/>
             <a:r>
-              <a:rPr lang="en-US" smtClean="0"/>
+              <a:rPr lang="en-US"/>
               <a:t>Second level</a:t>
             </a:r>
           </a:p>
           <a:p>
             <a:pPr lvl="2"/>
             <a:r>
-              <a:rPr lang="en-US" smtClean="0"/>
+              <a:rPr lang="en-US"/>
               <a:t>Third level</a:t>
             </a:r>
           </a:p>
           <a:p>
             <a:pPr lvl="3"/>
             <a:r>
-              <a:rPr lang="en-US" smtClean="0"/>
+              <a:rPr lang="en-US"/>
               <a:t>Fourth level</a:t>
             </a:r>
           </a:p>
           <a:p>
             <a:pPr lvl="4"/>
             <a:r>
-              <a:rPr lang="en-US" smtClean="0"/>
+              <a:rPr lang="en-US"/>
               <a:t>Fifth level</a:t>
             </a:r>
             <a:endParaRPr lang="en-US" dirty="0"/>
@@ -763,7 +764,7 @@
           <a:p>
             <a:fld id="{4C8584FF-F624-456A-A5E3-5DD8FA74DA99}" type="datetimeFigureOut">
               <a:rPr lang="en-GB" smtClean="0"/>
-              <a:t>12/12/2018</a:t>
+              <a:t>18/09/2019</a:t>
             </a:fld>
             <a:endParaRPr lang="en-GB"/>
           </a:p>
@@ -866,7 +867,7 @@
           </a:lstStyle>
           <a:p>
             <a:r>
-              <a:rPr lang="en-US" smtClean="0"/>
+              <a:rPr lang="en-US"/>
               <a:t>Click to edit Master title style</a:t>
             </a:r>
             <a:endParaRPr lang="en-US" dirty="0"/>
@@ -984,7 +985,7 @@
           <a:p>
             <a:pPr lvl="0"/>
             <a:r>
-              <a:rPr lang="en-US" smtClean="0"/>
+              <a:rPr lang="en-US"/>
               <a:t>Edit Master text styles</a:t>
             </a:r>
           </a:p>
@@ -1007,7 +1008,7 @@
           <a:p>
             <a:fld id="{4C8584FF-F624-456A-A5E3-5DD8FA74DA99}" type="datetimeFigureOut">
               <a:rPr lang="en-GB" smtClean="0"/>
-              <a:t>12/12/2018</a:t>
+              <a:t>18/09/2019</a:t>
             </a:fld>
             <a:endParaRPr lang="en-GB"/>
           </a:p>
@@ -1101,7 +1102,7 @@
           <a:lstStyle/>
           <a:p>
             <a:r>
-              <a:rPr lang="en-US" smtClean="0"/>
+              <a:rPr lang="en-US"/>
               <a:t>Click to edit Master title style</a:t>
             </a:r>
             <a:endParaRPr lang="en-US" dirty="0"/>
@@ -1130,35 +1131,35 @@
           <a:p>
             <a:pPr lvl="0"/>
             <a:r>
-              <a:rPr lang="en-US" smtClean="0"/>
+              <a:rPr lang="en-US"/>
               <a:t>Edit Master text styles</a:t>
             </a:r>
           </a:p>
           <a:p>
             <a:pPr lvl="1"/>
             <a:r>
-              <a:rPr lang="en-US" smtClean="0"/>
+              <a:rPr lang="en-US"/>
               <a:t>Second level</a:t>
             </a:r>
           </a:p>
           <a:p>
             <a:pPr lvl="2"/>
             <a:r>
-              <a:rPr lang="en-US" smtClean="0"/>
+              <a:rPr lang="en-US"/>
               <a:t>Third level</a:t>
             </a:r>
           </a:p>
           <a:p>
             <a:pPr lvl="3"/>
             <a:r>
-              <a:rPr lang="en-US" smtClean="0"/>
+              <a:rPr lang="en-US"/>
               <a:t>Fourth level</a:t>
             </a:r>
           </a:p>
           <a:p>
             <a:pPr lvl="4"/>
             <a:r>
-              <a:rPr lang="en-US" smtClean="0"/>
+              <a:rPr lang="en-US"/>
               <a:t>Fifth level</a:t>
             </a:r>
             <a:endParaRPr lang="en-US" dirty="0"/>
@@ -1187,35 +1188,35 @@
           <a:p>
             <a:pPr lvl="0"/>
             <a:r>
-              <a:rPr lang="en-US" smtClean="0"/>
+              <a:rPr lang="en-US"/>
               <a:t>Edit Master text styles</a:t>
             </a:r>
           </a:p>
           <a:p>
             <a:pPr lvl="1"/>
             <a:r>
-              <a:rPr lang="en-US" smtClean="0"/>
+              <a:rPr lang="en-US"/>
               <a:t>Second level</a:t>
             </a:r>
           </a:p>
           <a:p>
             <a:pPr lvl="2"/>
             <a:r>
-              <a:rPr lang="en-US" smtClean="0"/>
+              <a:rPr lang="en-US"/>
               <a:t>Third level</a:t>
             </a:r>
           </a:p>
           <a:p>
             <a:pPr lvl="3"/>
             <a:r>
-              <a:rPr lang="en-US" smtClean="0"/>
+              <a:rPr lang="en-US"/>
               <a:t>Fourth level</a:t>
             </a:r>
           </a:p>
           <a:p>
             <a:pPr lvl="4"/>
             <a:r>
-              <a:rPr lang="en-US" smtClean="0"/>
+              <a:rPr lang="en-US"/>
               <a:t>Fifth level</a:t>
             </a:r>
             <a:endParaRPr lang="en-US" dirty="0"/>
@@ -1239,7 +1240,7 @@
           <a:p>
             <a:fld id="{4C8584FF-F624-456A-A5E3-5DD8FA74DA99}" type="datetimeFigureOut">
               <a:rPr lang="en-GB" smtClean="0"/>
-              <a:t>12/12/2018</a:t>
+              <a:t>18/09/2019</a:t>
             </a:fld>
             <a:endParaRPr lang="en-GB"/>
           </a:p>
@@ -1338,7 +1339,7 @@
           <a:lstStyle/>
           <a:p>
             <a:r>
-              <a:rPr lang="en-US" smtClean="0"/>
+              <a:rPr lang="en-US"/>
               <a:t>Click to edit Master title style</a:t>
             </a:r>
             <a:endParaRPr lang="en-US" dirty="0"/>
@@ -1404,7 +1405,7 @@
           <a:p>
             <a:pPr lvl="0"/>
             <a:r>
-              <a:rPr lang="en-US" smtClean="0"/>
+              <a:rPr lang="en-US"/>
               <a:t>Edit Master text styles</a:t>
             </a:r>
           </a:p>
@@ -1432,35 +1433,35 @@
           <a:p>
             <a:pPr lvl="0"/>
             <a:r>
-              <a:rPr lang="en-US" smtClean="0"/>
+              <a:rPr lang="en-US"/>
               <a:t>Edit Master text styles</a:t>
             </a:r>
           </a:p>
           <a:p>
             <a:pPr lvl="1"/>
             <a:r>
-              <a:rPr lang="en-US" smtClean="0"/>
+              <a:rPr lang="en-US"/>
               <a:t>Second level</a:t>
             </a:r>
           </a:p>
           <a:p>
             <a:pPr lvl="2"/>
             <a:r>
-              <a:rPr lang="en-US" smtClean="0"/>
+              <a:rPr lang="en-US"/>
               <a:t>Third level</a:t>
             </a:r>
           </a:p>
           <a:p>
             <a:pPr lvl="3"/>
             <a:r>
-              <a:rPr lang="en-US" smtClean="0"/>
+              <a:rPr lang="en-US"/>
               <a:t>Fourth level</a:t>
             </a:r>
           </a:p>
           <a:p>
             <a:pPr lvl="4"/>
             <a:r>
-              <a:rPr lang="en-US" smtClean="0"/>
+              <a:rPr lang="en-US"/>
               <a:t>Fifth level</a:t>
             </a:r>
             <a:endParaRPr lang="en-US" dirty="0"/>
@@ -1526,7 +1527,7 @@
           <a:p>
             <a:pPr lvl="0"/>
             <a:r>
-              <a:rPr lang="en-US" smtClean="0"/>
+              <a:rPr lang="en-US"/>
               <a:t>Edit Master text styles</a:t>
             </a:r>
           </a:p>
@@ -1554,35 +1555,35 @@
           <a:p>
             <a:pPr lvl="0"/>
             <a:r>
-              <a:rPr lang="en-US" smtClean="0"/>
+              <a:rPr lang="en-US"/>
               <a:t>Edit Master text styles</a:t>
             </a:r>
           </a:p>
           <a:p>
             <a:pPr lvl="1"/>
             <a:r>
-              <a:rPr lang="en-US" smtClean="0"/>
+              <a:rPr lang="en-US"/>
               <a:t>Second level</a:t>
             </a:r>
           </a:p>
           <a:p>
             <a:pPr lvl="2"/>
             <a:r>
-              <a:rPr lang="en-US" smtClean="0"/>
+              <a:rPr lang="en-US"/>
               <a:t>Third level</a:t>
             </a:r>
           </a:p>
           <a:p>
             <a:pPr lvl="3"/>
             <a:r>
-              <a:rPr lang="en-US" smtClean="0"/>
+              <a:rPr lang="en-US"/>
               <a:t>Fourth level</a:t>
             </a:r>
           </a:p>
           <a:p>
             <a:pPr lvl="4"/>
             <a:r>
-              <a:rPr lang="en-US" smtClean="0"/>
+              <a:rPr lang="en-US"/>
               <a:t>Fifth level</a:t>
             </a:r>
             <a:endParaRPr lang="en-US" dirty="0"/>
@@ -1606,7 +1607,7 @@
           <a:p>
             <a:fld id="{4C8584FF-F624-456A-A5E3-5DD8FA74DA99}" type="datetimeFigureOut">
               <a:rPr lang="en-GB" smtClean="0"/>
-              <a:t>12/12/2018</a:t>
+              <a:t>18/09/2019</a:t>
             </a:fld>
             <a:endParaRPr lang="en-GB"/>
           </a:p>
@@ -1700,7 +1701,7 @@
           <a:lstStyle/>
           <a:p>
             <a:r>
-              <a:rPr lang="en-US" smtClean="0"/>
+              <a:rPr lang="en-US"/>
               <a:t>Click to edit Master title style</a:t>
             </a:r>
             <a:endParaRPr lang="en-US" dirty="0"/>
@@ -1724,7 +1725,7 @@
           <a:p>
             <a:fld id="{4C8584FF-F624-456A-A5E3-5DD8FA74DA99}" type="datetimeFigureOut">
               <a:rPr lang="en-GB" smtClean="0"/>
-              <a:t>12/12/2018</a:t>
+              <a:t>18/09/2019</a:t>
             </a:fld>
             <a:endParaRPr lang="en-GB"/>
           </a:p>
@@ -1819,7 +1820,7 @@
           <a:p>
             <a:fld id="{4C8584FF-F624-456A-A5E3-5DD8FA74DA99}" type="datetimeFigureOut">
               <a:rPr lang="en-GB" smtClean="0"/>
-              <a:t>12/12/2018</a:t>
+              <a:t>18/09/2019</a:t>
             </a:fld>
             <a:endParaRPr lang="en-GB"/>
           </a:p>
@@ -1922,7 +1923,7 @@
           </a:lstStyle>
           <a:p>
             <a:r>
-              <a:rPr lang="en-US" smtClean="0"/>
+              <a:rPr lang="en-US"/>
               <a:t>Click to edit Master title style</a:t>
             </a:r>
             <a:endParaRPr lang="en-US" dirty="0"/>
@@ -1979,35 +1980,35 @@
           <a:p>
             <a:pPr lvl="0"/>
             <a:r>
-              <a:rPr lang="en-US" smtClean="0"/>
+              <a:rPr lang="en-US"/>
               <a:t>Edit Master text styles</a:t>
             </a:r>
           </a:p>
           <a:p>
             <a:pPr lvl="1"/>
             <a:r>
-              <a:rPr lang="en-US" smtClean="0"/>
+              <a:rPr lang="en-US"/>
               <a:t>Second level</a:t>
             </a:r>
           </a:p>
           <a:p>
             <a:pPr lvl="2"/>
             <a:r>
-              <a:rPr lang="en-US" smtClean="0"/>
+              <a:rPr lang="en-US"/>
               <a:t>Third level</a:t>
             </a:r>
           </a:p>
           <a:p>
             <a:pPr lvl="3"/>
             <a:r>
-              <a:rPr lang="en-US" smtClean="0"/>
+              <a:rPr lang="en-US"/>
               <a:t>Fourth level</a:t>
             </a:r>
           </a:p>
           <a:p>
             <a:pPr lvl="4"/>
             <a:r>
-              <a:rPr lang="en-US" smtClean="0"/>
+              <a:rPr lang="en-US"/>
               <a:t>Fifth level</a:t>
             </a:r>
             <a:endParaRPr lang="en-US" dirty="0"/>
@@ -2073,7 +2074,7 @@
           <a:p>
             <a:pPr lvl="0"/>
             <a:r>
-              <a:rPr lang="en-US" smtClean="0"/>
+              <a:rPr lang="en-US"/>
               <a:t>Edit Master text styles</a:t>
             </a:r>
           </a:p>
@@ -2096,7 +2097,7 @@
           <a:p>
             <a:fld id="{4C8584FF-F624-456A-A5E3-5DD8FA74DA99}" type="datetimeFigureOut">
               <a:rPr lang="en-GB" smtClean="0"/>
-              <a:t>12/12/2018</a:t>
+              <a:t>18/09/2019</a:t>
             </a:fld>
             <a:endParaRPr lang="en-GB"/>
           </a:p>
@@ -2199,7 +2200,7 @@
           </a:lstStyle>
           <a:p>
             <a:r>
-              <a:rPr lang="en-US" smtClean="0"/>
+              <a:rPr lang="en-US"/>
               <a:t>Click to edit Master title style</a:t>
             </a:r>
             <a:endParaRPr lang="en-US" dirty="0"/>
@@ -2264,7 +2265,7 @@
           </a:lstStyle>
           <a:p>
             <a:r>
-              <a:rPr lang="en-US" smtClean="0"/>
+              <a:rPr lang="en-US"/>
               <a:t>Click icon to add picture</a:t>
             </a:r>
             <a:endParaRPr lang="en-US" dirty="0"/>
@@ -2330,7 +2331,7 @@
           <a:p>
             <a:pPr lvl="0"/>
             <a:r>
-              <a:rPr lang="en-US" smtClean="0"/>
+              <a:rPr lang="en-US"/>
               <a:t>Edit Master text styles</a:t>
             </a:r>
           </a:p>
@@ -2353,7 +2354,7 @@
           <a:p>
             <a:fld id="{4C8584FF-F624-456A-A5E3-5DD8FA74DA99}" type="datetimeFigureOut">
               <a:rPr lang="en-GB" smtClean="0"/>
-              <a:t>12/12/2018</a:t>
+              <a:t>18/09/2019</a:t>
             </a:fld>
             <a:endParaRPr lang="en-GB"/>
           </a:p>
@@ -2462,7 +2463,7 @@
           <a:lstStyle/>
           <a:p>
             <a:r>
-              <a:rPr lang="en-US" smtClean="0"/>
+              <a:rPr lang="en-US"/>
               <a:t>Click to edit Master title style</a:t>
             </a:r>
             <a:endParaRPr lang="en-US" dirty="0"/>
@@ -2496,35 +2497,35 @@
           <a:p>
             <a:pPr lvl="0"/>
             <a:r>
-              <a:rPr lang="en-US" smtClean="0"/>
+              <a:rPr lang="en-US"/>
               <a:t>Edit Master text styles</a:t>
             </a:r>
           </a:p>
           <a:p>
             <a:pPr lvl="1"/>
             <a:r>
-              <a:rPr lang="en-US" smtClean="0"/>
+              <a:rPr lang="en-US"/>
               <a:t>Second level</a:t>
             </a:r>
           </a:p>
           <a:p>
             <a:pPr lvl="2"/>
             <a:r>
-              <a:rPr lang="en-US" smtClean="0"/>
+              <a:rPr lang="en-US"/>
               <a:t>Third level</a:t>
             </a:r>
           </a:p>
           <a:p>
             <a:pPr lvl="3"/>
             <a:r>
-              <a:rPr lang="en-US" smtClean="0"/>
+              <a:rPr lang="en-US"/>
               <a:t>Fourth level</a:t>
             </a:r>
           </a:p>
           <a:p>
             <a:pPr lvl="4"/>
             <a:r>
-              <a:rPr lang="en-US" smtClean="0"/>
+              <a:rPr lang="en-US"/>
               <a:t>Fifth level</a:t>
             </a:r>
             <a:endParaRPr lang="en-US" dirty="0"/>
@@ -2566,7 +2567,7 @@
           <a:p>
             <a:fld id="{4C8584FF-F624-456A-A5E3-5DD8FA74DA99}" type="datetimeFigureOut">
               <a:rPr lang="en-GB" smtClean="0"/>
-              <a:t>12/12/2018</a:t>
+              <a:t>18/09/2019</a:t>
             </a:fld>
             <a:endParaRPr lang="en-GB"/>
           </a:p>
@@ -2973,230 +2974,14 @@
       </p:grpSpPr>
       <p:sp>
         <p:nvSpPr>
-          <p:cNvPr id="11" name="Freeform 10"/>
-          <p:cNvSpPr/>
-          <p:nvPr/>
-        </p:nvSpPr>
-        <p:spPr>
-          <a:xfrm rot="20842226">
-            <a:off x="-719424" y="-533989"/>
-            <a:ext cx="3397599" cy="2627871"/>
-          </a:xfrm>
-          <a:custGeom>
-            <a:avLst/>
-            <a:gdLst>
-              <a:gd name="connsiteX0" fmla="*/ 159098 w 3397599"/>
-              <a:gd name="connsiteY0" fmla="*/ 938854 h 2381586"/>
-              <a:gd name="connsiteX1" fmla="*/ 1857724 w 3397599"/>
-              <a:gd name="connsiteY1" fmla="*/ 5403 h 2381586"/>
-              <a:gd name="connsiteX2" fmla="*/ 16223 w 3397599"/>
-              <a:gd name="connsiteY2" fmla="*/ 1316679 h 2381586"/>
-              <a:gd name="connsiteX3" fmla="*/ 2453036 w 3397599"/>
-              <a:gd name="connsiteY3" fmla="*/ 94303 h 2381586"/>
-              <a:gd name="connsiteX4" fmla="*/ 348 w 3397599"/>
-              <a:gd name="connsiteY4" fmla="*/ 1677041 h 2381586"/>
-              <a:gd name="connsiteX5" fmla="*/ 2657824 w 3397599"/>
-              <a:gd name="connsiteY5" fmla="*/ 268928 h 2381586"/>
-              <a:gd name="connsiteX6" fmla="*/ 281336 w 3397599"/>
-              <a:gd name="connsiteY6" fmla="*/ 1861191 h 2381586"/>
-              <a:gd name="connsiteX7" fmla="*/ 2753074 w 3397599"/>
-              <a:gd name="connsiteY7" fmla="*/ 446729 h 2381586"/>
-              <a:gd name="connsiteX8" fmla="*/ 325786 w 3397599"/>
-              <a:gd name="connsiteY8" fmla="*/ 2169166 h 2381586"/>
-              <a:gd name="connsiteX9" fmla="*/ 3019774 w 3397599"/>
-              <a:gd name="connsiteY9" fmla="*/ 551504 h 2381586"/>
-              <a:gd name="connsiteX10" fmla="*/ 627411 w 3397599"/>
-              <a:gd name="connsiteY10" fmla="*/ 2288229 h 2381586"/>
-              <a:gd name="connsiteX11" fmla="*/ 2995961 w 3397599"/>
-              <a:gd name="connsiteY11" fmla="*/ 895991 h 2381586"/>
-              <a:gd name="connsiteX12" fmla="*/ 962374 w 3397599"/>
-              <a:gd name="connsiteY12" fmla="*/ 2377129 h 2381586"/>
-              <a:gd name="connsiteX13" fmla="*/ 2965799 w 3397599"/>
-              <a:gd name="connsiteY13" fmla="*/ 1386529 h 2381586"/>
-              <a:gd name="connsiteX14" fmla="*/ 1538636 w 3397599"/>
-              <a:gd name="connsiteY14" fmla="*/ 2362841 h 2381586"/>
-              <a:gd name="connsiteX15" fmla="*/ 3397599 w 3397599"/>
-              <a:gd name="connsiteY15" fmla="*/ 1577029 h 2381586"/>
-            </a:gdLst>
-            <a:ahLst/>
-            <a:cxnLst>
-              <a:cxn ang="0">
-                <a:pos x="connsiteX0" y="connsiteY0"/>
-              </a:cxn>
-              <a:cxn ang="0">
-                <a:pos x="connsiteX1" y="connsiteY1"/>
-              </a:cxn>
-              <a:cxn ang="0">
-                <a:pos x="connsiteX2" y="connsiteY2"/>
-              </a:cxn>
-              <a:cxn ang="0">
-                <a:pos x="connsiteX3" y="connsiteY3"/>
-              </a:cxn>
-              <a:cxn ang="0">
-                <a:pos x="connsiteX4" y="connsiteY4"/>
-              </a:cxn>
-              <a:cxn ang="0">
-                <a:pos x="connsiteX5" y="connsiteY5"/>
-              </a:cxn>
-              <a:cxn ang="0">
-                <a:pos x="connsiteX6" y="connsiteY6"/>
-              </a:cxn>
-              <a:cxn ang="0">
-                <a:pos x="connsiteX7" y="connsiteY7"/>
-              </a:cxn>
-              <a:cxn ang="0">
-                <a:pos x="connsiteX8" y="connsiteY8"/>
-              </a:cxn>
-              <a:cxn ang="0">
-                <a:pos x="connsiteX9" y="connsiteY9"/>
-              </a:cxn>
-              <a:cxn ang="0">
-                <a:pos x="connsiteX10" y="connsiteY10"/>
-              </a:cxn>
-              <a:cxn ang="0">
-                <a:pos x="connsiteX11" y="connsiteY11"/>
-              </a:cxn>
-              <a:cxn ang="0">
-                <a:pos x="connsiteX12" y="connsiteY12"/>
-              </a:cxn>
-              <a:cxn ang="0">
-                <a:pos x="connsiteX13" y="connsiteY13"/>
-              </a:cxn>
-              <a:cxn ang="0">
-                <a:pos x="connsiteX14" y="connsiteY14"/>
-              </a:cxn>
-              <a:cxn ang="0">
-                <a:pos x="connsiteX15" y="connsiteY15"/>
-              </a:cxn>
-            </a:cxnLst>
-            <a:rect l="l" t="t" r="r" b="b"/>
-            <a:pathLst>
-              <a:path w="3397599" h="2381586">
-                <a:moveTo>
-                  <a:pt x="159098" y="938854"/>
-                </a:moveTo>
-                <a:cubicBezTo>
-                  <a:pt x="1020317" y="440643"/>
-                  <a:pt x="1881536" y="-57568"/>
-                  <a:pt x="1857724" y="5403"/>
-                </a:cubicBezTo>
-                <a:cubicBezTo>
-                  <a:pt x="1833912" y="68374"/>
-                  <a:pt x="-82996" y="1301862"/>
-                  <a:pt x="16223" y="1316679"/>
-                </a:cubicBezTo>
-                <a:cubicBezTo>
-                  <a:pt x="115442" y="1331496"/>
-                  <a:pt x="2455682" y="34243"/>
-                  <a:pt x="2453036" y="94303"/>
-                </a:cubicBezTo>
-                <a:cubicBezTo>
-                  <a:pt x="2450390" y="154363"/>
-                  <a:pt x="-33783" y="1647937"/>
-                  <a:pt x="348" y="1677041"/>
-                </a:cubicBezTo>
-                <a:cubicBezTo>
-                  <a:pt x="34479" y="1706145"/>
-                  <a:pt x="2610993" y="238236"/>
-                  <a:pt x="2657824" y="268928"/>
-                </a:cubicBezTo>
-                <a:cubicBezTo>
-                  <a:pt x="2704655" y="299620"/>
-                  <a:pt x="265461" y="1831558"/>
-                  <a:pt x="281336" y="1861191"/>
-                </a:cubicBezTo>
-                <a:cubicBezTo>
-                  <a:pt x="297211" y="1890825"/>
-                  <a:pt x="2745666" y="395400"/>
-                  <a:pt x="2753074" y="446729"/>
-                </a:cubicBezTo>
-                <a:cubicBezTo>
-                  <a:pt x="2760482" y="498058"/>
-                  <a:pt x="281336" y="2151704"/>
-                  <a:pt x="325786" y="2169166"/>
-                </a:cubicBezTo>
-                <a:cubicBezTo>
-                  <a:pt x="370236" y="2186628"/>
-                  <a:pt x="2969503" y="531660"/>
-                  <a:pt x="3019774" y="551504"/>
-                </a:cubicBezTo>
-                <a:cubicBezTo>
-                  <a:pt x="3070045" y="571348"/>
-                  <a:pt x="631380" y="2230815"/>
-                  <a:pt x="627411" y="2288229"/>
-                </a:cubicBezTo>
-                <a:cubicBezTo>
-                  <a:pt x="623442" y="2345643"/>
-                  <a:pt x="2940134" y="881174"/>
-                  <a:pt x="2995961" y="895991"/>
-                </a:cubicBezTo>
-                <a:cubicBezTo>
-                  <a:pt x="3051788" y="910808"/>
-                  <a:pt x="967401" y="2295373"/>
-                  <a:pt x="962374" y="2377129"/>
-                </a:cubicBezTo>
-                <a:cubicBezTo>
-                  <a:pt x="957347" y="2458885"/>
-                  <a:pt x="2869755" y="1388910"/>
-                  <a:pt x="2965799" y="1386529"/>
-                </a:cubicBezTo>
-                <a:cubicBezTo>
-                  <a:pt x="3061843" y="1384148"/>
-                  <a:pt x="1466669" y="2331091"/>
-                  <a:pt x="1538636" y="2362841"/>
-                </a:cubicBezTo>
-                <a:cubicBezTo>
-                  <a:pt x="1610603" y="2394591"/>
-                  <a:pt x="2504101" y="1985810"/>
-                  <a:pt x="3397599" y="1577029"/>
-                </a:cubicBezTo>
-              </a:path>
-            </a:pathLst>
-          </a:custGeom>
-          <a:noFill/>
-          <a:ln w="76200">
-            <a:solidFill>
-              <a:srgbClr val="002060">
-                <a:alpha val="25000"/>
-              </a:srgbClr>
-            </a:solidFill>
-          </a:ln>
-        </p:spPr>
-        <p:style>
-          <a:lnRef idx="2">
-            <a:schemeClr val="accent1">
-              <a:shade val="50000"/>
-            </a:schemeClr>
-          </a:lnRef>
-          <a:fillRef idx="1">
-            <a:schemeClr val="accent1"/>
-          </a:fillRef>
-          <a:effectRef idx="0">
-            <a:schemeClr val="accent1"/>
-          </a:effectRef>
-          <a:fontRef idx="minor">
-            <a:schemeClr val="lt1"/>
-          </a:fontRef>
-        </p:style>
-        <p:txBody>
-          <a:bodyPr rtlCol="0" anchor="ctr"/>
-          <a:lstStyle/>
-          <a:p>
-            <a:pPr algn="ctr"/>
-            <a:endParaRPr lang="en-GB"/>
-          </a:p>
-        </p:txBody>
-      </p:sp>
-      <p:sp>
-        <p:nvSpPr>
           <p:cNvPr id="14" name="Freeform 13"/>
           <p:cNvSpPr/>
           <p:nvPr/>
         </p:nvSpPr>
         <p:spPr>
           <a:xfrm>
-            <a:off x="12699" y="241300"/>
-            <a:ext cx="1782761" cy="1336692"/>
+            <a:off x="12699" y="55832"/>
+            <a:ext cx="1782761" cy="1707628"/>
           </a:xfrm>
           <a:custGeom>
             <a:avLst/>
@@ -3682,6 +3467,60 @@
           </a:p>
         </p:txBody>
       </p:sp>
+      <p:sp>
+        <p:nvSpPr>
+          <p:cNvPr id="5" name="Rectangle 4">
+            <a:extLst>
+              <a:ext uri="{FF2B5EF4-FFF2-40B4-BE49-F238E27FC236}">
+                <a16:creationId xmlns:a16="http://schemas.microsoft.com/office/drawing/2014/main" id="{8C02617B-0A45-477E-A50F-890AC87CD2A4}"/>
+              </a:ext>
+            </a:extLst>
+          </p:cNvPr>
+          <p:cNvSpPr/>
+          <p:nvPr/>
+        </p:nvSpPr>
+        <p:spPr>
+          <a:xfrm>
+            <a:off x="-1" y="-1"/>
+            <a:ext cx="1800225" cy="1800225"/>
+          </a:xfrm>
+          <a:prstGeom prst="rect">
+            <a:avLst/>
+          </a:prstGeom>
+          <a:solidFill>
+            <a:srgbClr val="FFFFFF">
+              <a:alpha val="0"/>
+            </a:srgbClr>
+          </a:solidFill>
+          <a:ln>
+            <a:noFill/>
+          </a:ln>
+        </p:spPr>
+        <p:style>
+          <a:lnRef idx="2">
+            <a:schemeClr val="accent1">
+              <a:shade val="50000"/>
+            </a:schemeClr>
+          </a:lnRef>
+          <a:fillRef idx="1">
+            <a:schemeClr val="accent1"/>
+          </a:fillRef>
+          <a:effectRef idx="0">
+            <a:schemeClr val="accent1"/>
+          </a:effectRef>
+          <a:fontRef idx="minor">
+            <a:schemeClr val="lt1"/>
+          </a:fontRef>
+        </p:style>
+        <p:txBody>
+          <a:bodyPr rtlCol="0" anchor="ctr"/>
+          <a:lstStyle/>
+          <a:p>
+            <a:pPr algn="ctr"/>
+            <a:endParaRPr lang="en-GB"/>
+          </a:p>
+        </p:txBody>
+      </p:sp>
     </p:spTree>
     <p:extLst>
       <p:ext uri="{BB962C8B-B14F-4D97-AF65-F5344CB8AC3E}">
@@ -3692,13 +3531,390 @@
   <p:clrMapOvr>
     <a:masterClrMapping/>
   </p:clrMapOvr>
-  <p:timing>
-    <p:tnLst>
-      <p:par>
-        <p:cTn id="1" dur="indefinite" restart="never" nodeType="tmRoot"/>
-      </p:par>
-    </p:tnLst>
-  </p:timing>
+</p:sld>
+</file>
+
+<file path=ppt/slides/slide2.xml><?xml version="1.0" encoding="utf-8"?>
+<p:sld xmlns:a="http://schemas.openxmlformats.org/drawingml/2006/main" xmlns:r="http://schemas.openxmlformats.org/officeDocument/2006/relationships" xmlns:p="http://schemas.openxmlformats.org/presentationml/2006/main">
+  <p:cSld>
+    <p:spTree>
+      <p:nvGrpSpPr>
+        <p:cNvPr id="1" name=""/>
+        <p:cNvGrpSpPr/>
+        <p:nvPr/>
+      </p:nvGrpSpPr>
+      <p:grpSpPr>
+        <a:xfrm>
+          <a:off x="0" y="0"/>
+          <a:ext cx="0" cy="0"/>
+          <a:chOff x="0" y="0"/>
+          <a:chExt cx="0" cy="0"/>
+        </a:xfrm>
+      </p:grpSpPr>
+      <p:sp>
+        <p:nvSpPr>
+          <p:cNvPr id="7" name="Rectangle 6">
+            <a:extLst>
+              <a:ext uri="{FF2B5EF4-FFF2-40B4-BE49-F238E27FC236}">
+                <a16:creationId xmlns:a16="http://schemas.microsoft.com/office/drawing/2014/main" id="{F9580862-A104-4B3C-B735-4C00B6CC991F}"/>
+              </a:ext>
+            </a:extLst>
+          </p:cNvPr>
+          <p:cNvSpPr/>
+          <p:nvPr/>
+        </p:nvSpPr>
+        <p:spPr>
+          <a:xfrm>
+            <a:off x="-1" y="-1"/>
+            <a:ext cx="1800225" cy="1800225"/>
+          </a:xfrm>
+          <a:prstGeom prst="rect">
+            <a:avLst/>
+          </a:prstGeom>
+          <a:solidFill>
+            <a:srgbClr val="FFFFFF">
+              <a:alpha val="0"/>
+            </a:srgbClr>
+          </a:solidFill>
+          <a:ln>
+            <a:noFill/>
+          </a:ln>
+        </p:spPr>
+        <p:style>
+          <a:lnRef idx="2">
+            <a:schemeClr val="accent1">
+              <a:shade val="50000"/>
+            </a:schemeClr>
+          </a:lnRef>
+          <a:fillRef idx="1">
+            <a:schemeClr val="accent1"/>
+          </a:fillRef>
+          <a:effectRef idx="0">
+            <a:schemeClr val="accent1"/>
+          </a:effectRef>
+          <a:fontRef idx="minor">
+            <a:schemeClr val="lt1"/>
+          </a:fontRef>
+        </p:style>
+        <p:txBody>
+          <a:bodyPr rtlCol="0" anchor="ctr"/>
+          <a:lstStyle/>
+          <a:p>
+            <a:pPr algn="ctr"/>
+            <a:endParaRPr lang="en-GB"/>
+          </a:p>
+        </p:txBody>
+      </p:sp>
+      <p:sp>
+        <p:nvSpPr>
+          <p:cNvPr id="3" name="Rectangle: Rounded Corners 2">
+            <a:extLst>
+              <a:ext uri="{FF2B5EF4-FFF2-40B4-BE49-F238E27FC236}">
+                <a16:creationId xmlns:a16="http://schemas.microsoft.com/office/drawing/2014/main" id="{48CC6A52-64FE-4779-A398-4B26E538FADB}"/>
+              </a:ext>
+            </a:extLst>
+          </p:cNvPr>
+          <p:cNvSpPr/>
+          <p:nvPr/>
+        </p:nvSpPr>
+        <p:spPr>
+          <a:xfrm>
+            <a:off x="90112" y="82947"/>
+            <a:ext cx="1620000" cy="360000"/>
+          </a:xfrm>
+          <a:prstGeom prst="roundRect">
+            <a:avLst/>
+          </a:prstGeom>
+          <a:gradFill flip="none" rotWithShape="1">
+            <a:gsLst>
+              <a:gs pos="0">
+                <a:srgbClr val="8BFB8B">
+                  <a:tint val="66000"/>
+                  <a:satMod val="160000"/>
+                </a:srgbClr>
+              </a:gs>
+              <a:gs pos="50000">
+                <a:srgbClr val="8BFB8B">
+                  <a:tint val="44500"/>
+                  <a:satMod val="160000"/>
+                </a:srgbClr>
+              </a:gs>
+              <a:gs pos="100000">
+                <a:srgbClr val="8BFB8B">
+                  <a:tint val="23500"/>
+                  <a:satMod val="160000"/>
+                </a:srgbClr>
+              </a:gs>
+            </a:gsLst>
+            <a:lin ang="16200000" scaled="1"/>
+            <a:tileRect/>
+          </a:gradFill>
+          <a:ln w="6350">
+            <a:solidFill>
+              <a:schemeClr val="tx1"/>
+            </a:solidFill>
+          </a:ln>
+        </p:spPr>
+        <p:style>
+          <a:lnRef idx="2">
+            <a:schemeClr val="accent1">
+              <a:shade val="50000"/>
+            </a:schemeClr>
+          </a:lnRef>
+          <a:fillRef idx="1">
+            <a:schemeClr val="accent1"/>
+          </a:fillRef>
+          <a:effectRef idx="0">
+            <a:schemeClr val="accent1"/>
+          </a:effectRef>
+          <a:fontRef idx="minor">
+            <a:schemeClr val="lt1"/>
+          </a:fontRef>
+        </p:style>
+        <p:txBody>
+          <a:bodyPr rtlCol="0" anchor="ctr"/>
+          <a:lstStyle/>
+          <a:p>
+            <a:pPr algn="ctr"/>
+            <a:endParaRPr lang="en-GB"/>
+          </a:p>
+        </p:txBody>
+      </p:sp>
+      <p:sp>
+        <p:nvSpPr>
+          <p:cNvPr id="8" name="Rectangle: Rounded Corners 7">
+            <a:extLst>
+              <a:ext uri="{FF2B5EF4-FFF2-40B4-BE49-F238E27FC236}">
+                <a16:creationId xmlns:a16="http://schemas.microsoft.com/office/drawing/2014/main" id="{8BCE5E73-6193-4228-BA43-A0045DFAA386}"/>
+              </a:ext>
+            </a:extLst>
+          </p:cNvPr>
+          <p:cNvSpPr/>
+          <p:nvPr/>
+        </p:nvSpPr>
+        <p:spPr>
+          <a:xfrm>
+            <a:off x="90112" y="510798"/>
+            <a:ext cx="1620000" cy="360000"/>
+          </a:xfrm>
+          <a:prstGeom prst="roundRect">
+            <a:avLst/>
+          </a:prstGeom>
+          <a:gradFill flip="none" rotWithShape="1">
+            <a:gsLst>
+              <a:gs pos="0">
+                <a:srgbClr val="FBC085">
+                  <a:tint val="66000"/>
+                  <a:satMod val="160000"/>
+                </a:srgbClr>
+              </a:gs>
+              <a:gs pos="50000">
+                <a:srgbClr val="FBC085">
+                  <a:tint val="44500"/>
+                  <a:satMod val="160000"/>
+                </a:srgbClr>
+              </a:gs>
+              <a:gs pos="100000">
+                <a:srgbClr val="FBC085">
+                  <a:tint val="23500"/>
+                  <a:satMod val="160000"/>
+                </a:srgbClr>
+              </a:gs>
+            </a:gsLst>
+            <a:lin ang="16200000" scaled="1"/>
+            <a:tileRect/>
+          </a:gradFill>
+          <a:ln w="6350">
+            <a:solidFill>
+              <a:schemeClr val="tx1"/>
+            </a:solidFill>
+          </a:ln>
+        </p:spPr>
+        <p:style>
+          <a:lnRef idx="2">
+            <a:schemeClr val="accent1">
+              <a:shade val="50000"/>
+            </a:schemeClr>
+          </a:lnRef>
+          <a:fillRef idx="1">
+            <a:schemeClr val="accent1"/>
+          </a:fillRef>
+          <a:effectRef idx="0">
+            <a:schemeClr val="accent1"/>
+          </a:effectRef>
+          <a:fontRef idx="minor">
+            <a:schemeClr val="lt1"/>
+          </a:fontRef>
+        </p:style>
+        <p:txBody>
+          <a:bodyPr rtlCol="0" anchor="ctr"/>
+          <a:lstStyle/>
+          <a:p>
+            <a:pPr algn="ctr"/>
+            <a:endParaRPr lang="en-GB"/>
+          </a:p>
+        </p:txBody>
+      </p:sp>
+      <p:sp>
+        <p:nvSpPr>
+          <p:cNvPr id="9" name="Rectangle: Rounded Corners 8">
+            <a:extLst>
+              <a:ext uri="{FF2B5EF4-FFF2-40B4-BE49-F238E27FC236}">
+                <a16:creationId xmlns:a16="http://schemas.microsoft.com/office/drawing/2014/main" id="{BD9F6341-0B9B-43D4-8102-044F1238AB98}"/>
+              </a:ext>
+            </a:extLst>
+          </p:cNvPr>
+          <p:cNvSpPr/>
+          <p:nvPr/>
+        </p:nvSpPr>
+        <p:spPr>
+          <a:xfrm>
+            <a:off x="90112" y="938649"/>
+            <a:ext cx="1620000" cy="360000"/>
+          </a:xfrm>
+          <a:prstGeom prst="roundRect">
+            <a:avLst/>
+          </a:prstGeom>
+          <a:gradFill flip="none" rotWithShape="1">
+            <a:gsLst>
+              <a:gs pos="0">
+                <a:srgbClr val="FC9898">
+                  <a:tint val="66000"/>
+                  <a:satMod val="160000"/>
+                </a:srgbClr>
+              </a:gs>
+              <a:gs pos="50000">
+                <a:srgbClr val="FC9898">
+                  <a:tint val="44500"/>
+                  <a:satMod val="160000"/>
+                </a:srgbClr>
+              </a:gs>
+              <a:gs pos="100000">
+                <a:srgbClr val="FC9898">
+                  <a:tint val="23500"/>
+                  <a:satMod val="160000"/>
+                </a:srgbClr>
+              </a:gs>
+            </a:gsLst>
+            <a:lin ang="16200000" scaled="1"/>
+            <a:tileRect/>
+          </a:gradFill>
+          <a:ln w="6350">
+            <a:solidFill>
+              <a:schemeClr val="tx1"/>
+            </a:solidFill>
+          </a:ln>
+        </p:spPr>
+        <p:style>
+          <a:lnRef idx="2">
+            <a:schemeClr val="accent1">
+              <a:shade val="50000"/>
+            </a:schemeClr>
+          </a:lnRef>
+          <a:fillRef idx="1">
+            <a:schemeClr val="accent1"/>
+          </a:fillRef>
+          <a:effectRef idx="0">
+            <a:schemeClr val="accent1"/>
+          </a:effectRef>
+          <a:fontRef idx="minor">
+            <a:schemeClr val="lt1"/>
+          </a:fontRef>
+        </p:style>
+        <p:txBody>
+          <a:bodyPr rtlCol="0" anchor="ctr"/>
+          <a:lstStyle/>
+          <a:p>
+            <a:pPr algn="ctr"/>
+            <a:endParaRPr lang="en-GB"/>
+          </a:p>
+        </p:txBody>
+      </p:sp>
+      <p:sp>
+        <p:nvSpPr>
+          <p:cNvPr id="10" name="Rectangle: Rounded Corners 9">
+            <a:extLst>
+              <a:ext uri="{FF2B5EF4-FFF2-40B4-BE49-F238E27FC236}">
+                <a16:creationId xmlns:a16="http://schemas.microsoft.com/office/drawing/2014/main" id="{FC06C416-9A8E-4E5C-AB12-EA44D4491E48}"/>
+              </a:ext>
+            </a:extLst>
+          </p:cNvPr>
+          <p:cNvSpPr/>
+          <p:nvPr/>
+        </p:nvSpPr>
+        <p:spPr>
+          <a:xfrm>
+            <a:off x="90112" y="1366501"/>
+            <a:ext cx="1620000" cy="360000"/>
+          </a:xfrm>
+          <a:prstGeom prst="roundRect">
+            <a:avLst/>
+          </a:prstGeom>
+          <a:gradFill flip="none" rotWithShape="1">
+            <a:gsLst>
+              <a:gs pos="0">
+                <a:srgbClr val="9C9CFB">
+                  <a:tint val="66000"/>
+                  <a:satMod val="160000"/>
+                </a:srgbClr>
+              </a:gs>
+              <a:gs pos="50000">
+                <a:srgbClr val="9C9CFB">
+                  <a:tint val="44500"/>
+                  <a:satMod val="160000"/>
+                </a:srgbClr>
+              </a:gs>
+              <a:gs pos="100000">
+                <a:srgbClr val="9C9CFB">
+                  <a:tint val="23500"/>
+                  <a:satMod val="160000"/>
+                </a:srgbClr>
+              </a:gs>
+            </a:gsLst>
+            <a:lin ang="16200000" scaled="1"/>
+            <a:tileRect/>
+          </a:gradFill>
+          <a:ln w="6350">
+            <a:solidFill>
+              <a:schemeClr val="tx1"/>
+            </a:solidFill>
+          </a:ln>
+        </p:spPr>
+        <p:style>
+          <a:lnRef idx="2">
+            <a:schemeClr val="accent1">
+              <a:shade val="50000"/>
+            </a:schemeClr>
+          </a:lnRef>
+          <a:fillRef idx="1">
+            <a:schemeClr val="accent1"/>
+          </a:fillRef>
+          <a:effectRef idx="0">
+            <a:schemeClr val="accent1"/>
+          </a:effectRef>
+          <a:fontRef idx="minor">
+            <a:schemeClr val="lt1"/>
+          </a:fontRef>
+        </p:style>
+        <p:txBody>
+          <a:bodyPr rtlCol="0" anchor="ctr"/>
+          <a:lstStyle/>
+          <a:p>
+            <a:pPr algn="ctr"/>
+            <a:endParaRPr lang="en-GB"/>
+          </a:p>
+        </p:txBody>
+      </p:sp>
+    </p:spTree>
+    <p:extLst>
+      <p:ext uri="{BB962C8B-B14F-4D97-AF65-F5344CB8AC3E}">
+        <p14:creationId xmlns:p14="http://schemas.microsoft.com/office/powerpoint/2010/main" val="1845207004"/>
+      </p:ext>
+    </p:extLst>
+  </p:cSld>
+  <p:clrMapOvr>
+    <a:masterClrMapping/>
+  </p:clrMapOvr>
 </p:sld>
 </file>
 

</xml_diff>